<commit_message>
fiddle with the map figure
</commit_message>
<xml_diff>
--- a/figures/maps/biotest_map.pptx
+++ b/figures/maps/biotest_map.pptx
@@ -26399,14 +26399,14 @@
         </p:nvSpPr>
         <p:spPr>
           <a:xfrm>
-            <a:off x="34229" y="30345"/>
-            <a:ext cx="5835456" cy="6810864"/>
+            <a:off x="45759" y="50799"/>
+            <a:ext cx="5812394" cy="6753225"/>
           </a:xfrm>
           <a:prstGeom prst="rect">
             <a:avLst/>
           </a:prstGeom>
           <a:noFill/>
-          <a:ln w="76200">
+          <a:ln w="101600">
             <a:solidFill>
               <a:srgbClr val="FF0000"/>
             </a:solidFill>

</xml_diff>

<commit_message>
2nd draf to coauthors
</commit_message>
<xml_diff>
--- a/figures/maps/biotest_map.pptx
+++ b/figures/maps/biotest_map.pptx
@@ -208,7 +208,7 @@
           <a:p>
             <a:fld id="{0CFDDE50-D61F-E040-810D-3AAF208E5DCC}" type="datetimeFigureOut">
               <a:rPr lang="en-SE" smtClean="0"/>
-              <a:t>2021-10-07</a:t>
+              <a:t>2022-02-23</a:t>
             </a:fld>
             <a:endParaRPr lang="en-SE"/>
           </a:p>
@@ -696,7 +696,7 @@
           <a:p>
             <a:fld id="{DD6D8C1E-9264-B143-9AED-D0296E346C04}" type="datetimeFigureOut">
               <a:rPr lang="en-SE" smtClean="0"/>
-              <a:t>2021-10-07</a:t>
+              <a:t>2022-02-23</a:t>
             </a:fld>
             <a:endParaRPr lang="en-SE"/>
           </a:p>
@@ -866,7 +866,7 @@
           <a:p>
             <a:fld id="{DD6D8C1E-9264-B143-9AED-D0296E346C04}" type="datetimeFigureOut">
               <a:rPr lang="en-SE" smtClean="0"/>
-              <a:t>2021-10-07</a:t>
+              <a:t>2022-02-23</a:t>
             </a:fld>
             <a:endParaRPr lang="en-SE"/>
           </a:p>
@@ -1046,7 +1046,7 @@
           <a:p>
             <a:fld id="{DD6D8C1E-9264-B143-9AED-D0296E346C04}" type="datetimeFigureOut">
               <a:rPr lang="en-SE" smtClean="0"/>
-              <a:t>2021-10-07</a:t>
+              <a:t>2022-02-23</a:t>
             </a:fld>
             <a:endParaRPr lang="en-SE"/>
           </a:p>
@@ -1216,7 +1216,7 @@
           <a:p>
             <a:fld id="{DD6D8C1E-9264-B143-9AED-D0296E346C04}" type="datetimeFigureOut">
               <a:rPr lang="en-SE" smtClean="0"/>
-              <a:t>2021-10-07</a:t>
+              <a:t>2022-02-23</a:t>
             </a:fld>
             <a:endParaRPr lang="en-SE"/>
           </a:p>
@@ -1460,7 +1460,7 @@
           <a:p>
             <a:fld id="{DD6D8C1E-9264-B143-9AED-D0296E346C04}" type="datetimeFigureOut">
               <a:rPr lang="en-SE" smtClean="0"/>
-              <a:t>2021-10-07</a:t>
+              <a:t>2022-02-23</a:t>
             </a:fld>
             <a:endParaRPr lang="en-SE"/>
           </a:p>
@@ -1692,7 +1692,7 @@
           <a:p>
             <a:fld id="{DD6D8C1E-9264-B143-9AED-D0296E346C04}" type="datetimeFigureOut">
               <a:rPr lang="en-SE" smtClean="0"/>
-              <a:t>2021-10-07</a:t>
+              <a:t>2022-02-23</a:t>
             </a:fld>
             <a:endParaRPr lang="en-SE"/>
           </a:p>
@@ -2059,7 +2059,7 @@
           <a:p>
             <a:fld id="{DD6D8C1E-9264-B143-9AED-D0296E346C04}" type="datetimeFigureOut">
               <a:rPr lang="en-SE" smtClean="0"/>
-              <a:t>2021-10-07</a:t>
+              <a:t>2022-02-23</a:t>
             </a:fld>
             <a:endParaRPr lang="en-SE"/>
           </a:p>
@@ -2177,7 +2177,7 @@
           <a:p>
             <a:fld id="{DD6D8C1E-9264-B143-9AED-D0296E346C04}" type="datetimeFigureOut">
               <a:rPr lang="en-SE" smtClean="0"/>
-              <a:t>2021-10-07</a:t>
+              <a:t>2022-02-23</a:t>
             </a:fld>
             <a:endParaRPr lang="en-SE"/>
           </a:p>
@@ -2272,7 +2272,7 @@
           <a:p>
             <a:fld id="{DD6D8C1E-9264-B143-9AED-D0296E346C04}" type="datetimeFigureOut">
               <a:rPr lang="en-SE" smtClean="0"/>
-              <a:t>2021-10-07</a:t>
+              <a:t>2022-02-23</a:t>
             </a:fld>
             <a:endParaRPr lang="en-SE"/>
           </a:p>
@@ -2549,7 +2549,7 @@
           <a:p>
             <a:fld id="{DD6D8C1E-9264-B143-9AED-D0296E346C04}" type="datetimeFigureOut">
               <a:rPr lang="en-SE" smtClean="0"/>
-              <a:t>2021-10-07</a:t>
+              <a:t>2022-02-23</a:t>
             </a:fld>
             <a:endParaRPr lang="en-SE"/>
           </a:p>
@@ -2806,7 +2806,7 @@
           <a:p>
             <a:fld id="{DD6D8C1E-9264-B143-9AED-D0296E346C04}" type="datetimeFigureOut">
               <a:rPr lang="en-SE" smtClean="0"/>
-              <a:t>2021-10-07</a:t>
+              <a:t>2022-02-23</a:t>
             </a:fld>
             <a:endParaRPr lang="en-SE"/>
           </a:p>
@@ -3019,7 +3019,7 @@
           <a:p>
             <a:fld id="{DD6D8C1E-9264-B143-9AED-D0296E346C04}" type="datetimeFigureOut">
               <a:rPr lang="en-SE" smtClean="0"/>
-              <a:t>2021-10-07</a:t>
+              <a:t>2022-02-23</a:t>
             </a:fld>
             <a:endParaRPr lang="en-SE"/>
           </a:p>
@@ -26203,7 +26203,7 @@
                 <a:latin typeface="Arial" panose="020B0604020202020204" pitchFamily="34" charset="0"/>
                 <a:cs typeface="Arial" panose="020B0604020202020204" pitchFamily="34" charset="0"/>
               </a:rPr>
-              <a:t>Biotest lake</a:t>
+              <a:t>Heated lake</a:t>
             </a:r>
           </a:p>
         </p:txBody>
@@ -26261,7 +26261,7 @@
         </p:nvSpPr>
         <p:spPr>
           <a:xfrm>
-            <a:off x="233276" y="1854264"/>
+            <a:off x="1685570" y="3584115"/>
             <a:ext cx="1860166" cy="954107"/>
           </a:xfrm>
           <a:prstGeom prst="rect">
@@ -26332,61 +26332,6 @@
       </p:sp>
       <p:sp>
         <p:nvSpPr>
-          <p:cNvPr id="32" name="TextBox 31">
-            <a:extLst>
-              <a:ext uri="{FF2B5EF4-FFF2-40B4-BE49-F238E27FC236}">
-                <a16:creationId xmlns:a16="http://schemas.microsoft.com/office/drawing/2014/main" id="{36CFDE68-3BC3-0A41-B93A-25523B8C530B}"/>
-              </a:ext>
-            </a:extLst>
-          </p:cNvPr>
-          <p:cNvSpPr txBox="1"/>
-          <p:nvPr/>
-        </p:nvSpPr>
-        <p:spPr>
-          <a:xfrm>
-            <a:off x="940351" y="3213646"/>
-            <a:ext cx="2605088" cy="954107"/>
-          </a:xfrm>
-          <a:prstGeom prst="rect">
-            <a:avLst/>
-          </a:prstGeom>
-          <a:noFill/>
-        </p:spPr>
-        <p:txBody>
-          <a:bodyPr wrap="square" rtlCol="0">
-            <a:spAutoFit/>
-          </a:bodyPr>
-          <a:lstStyle/>
-          <a:p>
-            <a:pPr algn="ctr"/>
-            <a:r>
-              <a:rPr lang="en-SE" sz="2800" dirty="0">
-                <a:solidFill>
-                  <a:srgbClr val="EA4B56"/>
-                </a:solidFill>
-                <a:latin typeface="Arial" panose="020B0604020202020204" pitchFamily="34" charset="0"/>
-                <a:cs typeface="Arial" panose="020B0604020202020204" pitchFamily="34" charset="0"/>
-              </a:rPr>
-              <a:t>Warm </a:t>
-            </a:r>
-          </a:p>
-          <a:p>
-            <a:pPr algn="ctr"/>
-            <a:r>
-              <a:rPr lang="en-SE" sz="2800" dirty="0">
-                <a:solidFill>
-                  <a:srgbClr val="EA4B56"/>
-                </a:solidFill>
-                <a:latin typeface="Arial" panose="020B0604020202020204" pitchFamily="34" charset="0"/>
-                <a:cs typeface="Arial" panose="020B0604020202020204" pitchFamily="34" charset="0"/>
-              </a:rPr>
-              <a:t>water outlet</a:t>
-            </a:r>
-          </a:p>
-        </p:txBody>
-      </p:sp>
-      <p:sp>
-        <p:nvSpPr>
           <p:cNvPr id="2" name="Rectangle 1">
             <a:extLst>
               <a:ext uri="{FF2B5EF4-FFF2-40B4-BE49-F238E27FC236}">
@@ -26399,8 +26344,8 @@
         </p:nvSpPr>
         <p:spPr>
           <a:xfrm>
-            <a:off x="45759" y="50799"/>
-            <a:ext cx="5812394" cy="6753225"/>
+            <a:off x="36881" y="31945"/>
+            <a:ext cx="5844334" cy="6799288"/>
           </a:xfrm>
           <a:prstGeom prst="rect">
             <a:avLst/>
@@ -26453,8 +26398,8 @@
         </p:nvCxnSpPr>
         <p:spPr>
           <a:xfrm flipV="1">
-            <a:off x="2389250" y="2858017"/>
-            <a:ext cx="233807" cy="442907"/>
+            <a:off x="2615653" y="2134413"/>
+            <a:ext cx="338641" cy="327192"/>
           </a:xfrm>
           <a:prstGeom prst="straightConnector1">
             <a:avLst/>
@@ -26497,8 +26442,8 @@
         </p:nvCxnSpPr>
         <p:spPr>
           <a:xfrm flipH="1">
-            <a:off x="2297719" y="5538585"/>
-            <a:ext cx="756200" cy="142373"/>
+            <a:off x="2393268" y="5469631"/>
+            <a:ext cx="687633" cy="328565"/>
           </a:xfrm>
           <a:prstGeom prst="straightConnector1">
             <a:avLst/>
@@ -27193,6 +27138,61 @@
           </a:prstGeom>
         </p:spPr>
       </p:pic>
+      <p:sp>
+        <p:nvSpPr>
+          <p:cNvPr id="49" name="TextBox 31">
+            <a:extLst>
+              <a:ext uri="{FF2B5EF4-FFF2-40B4-BE49-F238E27FC236}">
+                <a16:creationId xmlns:a16="http://schemas.microsoft.com/office/drawing/2014/main" id="{36CFDE68-3BC3-0A41-B93A-25523B8C530B}"/>
+              </a:ext>
+            </a:extLst>
+          </p:cNvPr>
+          <p:cNvSpPr txBox="1"/>
+          <p:nvPr/>
+        </p:nvSpPr>
+        <p:spPr>
+          <a:xfrm>
+            <a:off x="-36007" y="1873653"/>
+            <a:ext cx="2605088" cy="954107"/>
+          </a:xfrm>
+          <a:prstGeom prst="rect">
+            <a:avLst/>
+          </a:prstGeom>
+          <a:noFill/>
+        </p:spPr>
+        <p:txBody>
+          <a:bodyPr wrap="square" rtlCol="0">
+            <a:spAutoFit/>
+          </a:bodyPr>
+          <a:lstStyle/>
+          <a:p>
+            <a:pPr algn="ctr"/>
+            <a:r>
+              <a:rPr lang="en-SE" sz="2800" dirty="0">
+                <a:solidFill>
+                  <a:srgbClr val="EA4B56"/>
+                </a:solidFill>
+                <a:latin typeface="Arial" panose="020B0604020202020204" pitchFamily="34" charset="0"/>
+                <a:cs typeface="Arial" panose="020B0604020202020204" pitchFamily="34" charset="0"/>
+              </a:rPr>
+              <a:t>Warm </a:t>
+            </a:r>
+          </a:p>
+          <a:p>
+            <a:pPr algn="ctr"/>
+            <a:r>
+              <a:rPr lang="en-SE" sz="2800" dirty="0">
+                <a:solidFill>
+                  <a:srgbClr val="EA4B56"/>
+                </a:solidFill>
+                <a:latin typeface="Arial" panose="020B0604020202020204" pitchFamily="34" charset="0"/>
+                <a:cs typeface="Arial" panose="020B0604020202020204" pitchFamily="34" charset="0"/>
+              </a:rPr>
+              <a:t>water outlet</a:t>
+            </a:r>
+          </a:p>
+        </p:txBody>
+      </p:sp>
     </p:spTree>
     <p:extLst>
       <p:ext uri="{BB962C8B-B14F-4D97-AF65-F5344CB8AC3E}">

</xml_diff>

<commit_message>
minor edits to figures and text
</commit_message>
<xml_diff>
--- a/figures/maps/biotest_map.pptx
+++ b/figures/maps/biotest_map.pptx
@@ -208,7 +208,7 @@
           <a:p>
             <a:fld id="{0CFDDE50-D61F-E040-810D-3AAF208E5DCC}" type="datetimeFigureOut">
               <a:rPr lang="en-SE" smtClean="0"/>
-              <a:t>2022-02-23</a:t>
+              <a:t>2022-07-17</a:t>
             </a:fld>
             <a:endParaRPr lang="en-SE"/>
           </a:p>
@@ -696,7 +696,7 @@
           <a:p>
             <a:fld id="{DD6D8C1E-9264-B143-9AED-D0296E346C04}" type="datetimeFigureOut">
               <a:rPr lang="en-SE" smtClean="0"/>
-              <a:t>2022-02-23</a:t>
+              <a:t>2022-07-17</a:t>
             </a:fld>
             <a:endParaRPr lang="en-SE"/>
           </a:p>
@@ -866,7 +866,7 @@
           <a:p>
             <a:fld id="{DD6D8C1E-9264-B143-9AED-D0296E346C04}" type="datetimeFigureOut">
               <a:rPr lang="en-SE" smtClean="0"/>
-              <a:t>2022-02-23</a:t>
+              <a:t>2022-07-17</a:t>
             </a:fld>
             <a:endParaRPr lang="en-SE"/>
           </a:p>
@@ -1046,7 +1046,7 @@
           <a:p>
             <a:fld id="{DD6D8C1E-9264-B143-9AED-D0296E346C04}" type="datetimeFigureOut">
               <a:rPr lang="en-SE" smtClean="0"/>
-              <a:t>2022-02-23</a:t>
+              <a:t>2022-07-17</a:t>
             </a:fld>
             <a:endParaRPr lang="en-SE"/>
           </a:p>
@@ -1216,7 +1216,7 @@
           <a:p>
             <a:fld id="{DD6D8C1E-9264-B143-9AED-D0296E346C04}" type="datetimeFigureOut">
               <a:rPr lang="en-SE" smtClean="0"/>
-              <a:t>2022-02-23</a:t>
+              <a:t>2022-07-17</a:t>
             </a:fld>
             <a:endParaRPr lang="en-SE"/>
           </a:p>
@@ -1460,7 +1460,7 @@
           <a:p>
             <a:fld id="{DD6D8C1E-9264-B143-9AED-D0296E346C04}" type="datetimeFigureOut">
               <a:rPr lang="en-SE" smtClean="0"/>
-              <a:t>2022-02-23</a:t>
+              <a:t>2022-07-17</a:t>
             </a:fld>
             <a:endParaRPr lang="en-SE"/>
           </a:p>
@@ -1692,7 +1692,7 @@
           <a:p>
             <a:fld id="{DD6D8C1E-9264-B143-9AED-D0296E346C04}" type="datetimeFigureOut">
               <a:rPr lang="en-SE" smtClean="0"/>
-              <a:t>2022-02-23</a:t>
+              <a:t>2022-07-17</a:t>
             </a:fld>
             <a:endParaRPr lang="en-SE"/>
           </a:p>
@@ -2059,7 +2059,7 @@
           <a:p>
             <a:fld id="{DD6D8C1E-9264-B143-9AED-D0296E346C04}" type="datetimeFigureOut">
               <a:rPr lang="en-SE" smtClean="0"/>
-              <a:t>2022-02-23</a:t>
+              <a:t>2022-07-17</a:t>
             </a:fld>
             <a:endParaRPr lang="en-SE"/>
           </a:p>
@@ -2177,7 +2177,7 @@
           <a:p>
             <a:fld id="{DD6D8C1E-9264-B143-9AED-D0296E346C04}" type="datetimeFigureOut">
               <a:rPr lang="en-SE" smtClean="0"/>
-              <a:t>2022-02-23</a:t>
+              <a:t>2022-07-17</a:t>
             </a:fld>
             <a:endParaRPr lang="en-SE"/>
           </a:p>
@@ -2272,7 +2272,7 @@
           <a:p>
             <a:fld id="{DD6D8C1E-9264-B143-9AED-D0296E346C04}" type="datetimeFigureOut">
               <a:rPr lang="en-SE" smtClean="0"/>
-              <a:t>2022-02-23</a:t>
+              <a:t>2022-07-17</a:t>
             </a:fld>
             <a:endParaRPr lang="en-SE"/>
           </a:p>
@@ -2549,7 +2549,7 @@
           <a:p>
             <a:fld id="{DD6D8C1E-9264-B143-9AED-D0296E346C04}" type="datetimeFigureOut">
               <a:rPr lang="en-SE" smtClean="0"/>
-              <a:t>2022-02-23</a:t>
+              <a:t>2022-07-17</a:t>
             </a:fld>
             <a:endParaRPr lang="en-SE"/>
           </a:p>
@@ -2806,7 +2806,7 @@
           <a:p>
             <a:fld id="{DD6D8C1E-9264-B143-9AED-D0296E346C04}" type="datetimeFigureOut">
               <a:rPr lang="en-SE" smtClean="0"/>
-              <a:t>2022-02-23</a:t>
+              <a:t>2022-07-17</a:t>
             </a:fld>
             <a:endParaRPr lang="en-SE"/>
           </a:p>
@@ -3019,7 +3019,7 @@
           <a:p>
             <a:fld id="{DD6D8C1E-9264-B143-9AED-D0296E346C04}" type="datetimeFigureOut">
               <a:rPr lang="en-SE" smtClean="0"/>
-              <a:t>2022-02-23</a:t>
+              <a:t>2022-07-17</a:t>
             </a:fld>
             <a:endParaRPr lang="en-SE"/>
           </a:p>
@@ -26180,8 +26180,8 @@
         </p:nvSpPr>
         <p:spPr>
           <a:xfrm>
-            <a:off x="3802745" y="1078928"/>
-            <a:ext cx="1626712" cy="1077218"/>
+            <a:off x="2503564" y="1141240"/>
+            <a:ext cx="1575623" cy="707886"/>
           </a:xfrm>
           <a:prstGeom prst="rect">
             <a:avLst/>
@@ -26196,14 +26196,14 @@
           <a:p>
             <a:pPr algn="ctr"/>
             <a:r>
-              <a:rPr lang="en-SE" sz="3200" dirty="0">
+              <a:rPr lang="en-SE" sz="2000" dirty="0">
                 <a:solidFill>
                   <a:srgbClr val="EA4B56"/>
                 </a:solidFill>
                 <a:latin typeface="Arial" panose="020B0604020202020204" pitchFamily="34" charset="0"/>
                 <a:cs typeface="Arial" panose="020B0604020202020204" pitchFamily="34" charset="0"/>
               </a:rPr>
-              <a:t>Heated lake</a:t>
+              <a:t>Heated area</a:t>
             </a:r>
           </a:p>
         </p:txBody>
@@ -26262,7 +26262,7 @@
         <p:spPr>
           <a:xfrm>
             <a:off x="1685570" y="3584115"/>
-            <a:ext cx="1860166" cy="954107"/>
+            <a:ext cx="1860166" cy="830997"/>
           </a:xfrm>
           <a:prstGeom prst="rect">
             <a:avLst/>
@@ -26277,7 +26277,7 @@
           <a:p>
             <a:pPr algn="ctr"/>
             <a:r>
-              <a:rPr lang="en-SE" sz="2800" dirty="0">
+              <a:rPr lang="en-SE" sz="2400" dirty="0">
                 <a:solidFill>
                   <a:srgbClr val="5995C4"/>
                 </a:solidFill>
@@ -26304,7 +26304,7 @@
         <p:spPr>
           <a:xfrm>
             <a:off x="3016409" y="5238162"/>
-            <a:ext cx="2605088" cy="954107"/>
+            <a:ext cx="2605088" cy="830997"/>
           </a:xfrm>
           <a:prstGeom prst="rect">
             <a:avLst/>
@@ -26318,7 +26318,7 @@
           <a:lstStyle/>
           <a:p>
             <a:r>
-              <a:rPr lang="en-SE" sz="2800" dirty="0">
+              <a:rPr lang="en-SE" sz="2400" dirty="0">
                 <a:solidFill>
                   <a:srgbClr val="5995C4"/>
                 </a:solidFill>
@@ -26451,50 +26451,6 @@
           <a:ln w="76200">
             <a:solidFill>
               <a:srgbClr val="5995C4"/>
-            </a:solidFill>
-            <a:tailEnd type="triangle"/>
-          </a:ln>
-        </p:spPr>
-        <p:style>
-          <a:lnRef idx="1">
-            <a:schemeClr val="accent1"/>
-          </a:lnRef>
-          <a:fillRef idx="0">
-            <a:schemeClr val="accent1"/>
-          </a:fillRef>
-          <a:effectRef idx="0">
-            <a:schemeClr val="accent1"/>
-          </a:effectRef>
-          <a:fontRef idx="minor">
-            <a:schemeClr val="tx1"/>
-          </a:fontRef>
-        </p:style>
-      </p:cxnSp>
-      <p:cxnSp>
-        <p:nvCxnSpPr>
-          <p:cNvPr id="34" name="Straight Arrow Connector 33">
-            <a:extLst>
-              <a:ext uri="{FF2B5EF4-FFF2-40B4-BE49-F238E27FC236}">
-                <a16:creationId xmlns:a16="http://schemas.microsoft.com/office/drawing/2014/main" id="{BEE6A151-76FC-FC43-A9F4-C93DDEF07329}"/>
-              </a:ext>
-            </a:extLst>
-          </p:cNvPr>
-          <p:cNvCxnSpPr>
-            <a:cxnSpLocks/>
-          </p:cNvCxnSpPr>
-          <p:nvPr/>
-        </p:nvCxnSpPr>
-        <p:spPr>
-          <a:xfrm flipH="1" flipV="1">
-            <a:off x="3216989" y="1667823"/>
-            <a:ext cx="842574" cy="12591"/>
-          </a:xfrm>
-          <a:prstGeom prst="straightConnector1">
-            <a:avLst/>
-          </a:prstGeom>
-          <a:ln w="76200">
-            <a:solidFill>
-              <a:srgbClr val="EA4B56"/>
             </a:solidFill>
             <a:tailEnd type="triangle"/>
           </a:ln>
@@ -27153,7 +27109,7 @@
         <p:spPr>
           <a:xfrm>
             <a:off x="-36007" y="1873653"/>
-            <a:ext cx="2605088" cy="954107"/>
+            <a:ext cx="2605088" cy="830997"/>
           </a:xfrm>
           <a:prstGeom prst="rect">
             <a:avLst/>
@@ -27168,7 +27124,7 @@
           <a:p>
             <a:pPr algn="ctr"/>
             <a:r>
-              <a:rPr lang="en-SE" sz="2800" dirty="0">
+              <a:rPr lang="en-SE" sz="2400" dirty="0">
                 <a:solidFill>
                   <a:srgbClr val="EA4B56"/>
                 </a:solidFill>
@@ -27181,7 +27137,7 @@
           <a:p>
             <a:pPr algn="ctr"/>
             <a:r>
-              <a:rPr lang="en-SE" sz="2800" dirty="0">
+              <a:rPr lang="en-SE" sz="2400" dirty="0">
                 <a:solidFill>
                   <a:srgbClr val="EA4B56"/>
                 </a:solidFill>
@@ -27193,6 +27149,50 @@
           </a:p>
         </p:txBody>
       </p:sp>
+      <p:cxnSp>
+        <p:nvCxnSpPr>
+          <p:cNvPr id="15" name="Straight Arrow Connector 14">
+            <a:extLst>
+              <a:ext uri="{FF2B5EF4-FFF2-40B4-BE49-F238E27FC236}">
+                <a16:creationId xmlns:a16="http://schemas.microsoft.com/office/drawing/2014/main" id="{035A9DB4-7E82-A43B-FA95-872F806DA151}"/>
+              </a:ext>
+            </a:extLst>
+          </p:cNvPr>
+          <p:cNvCxnSpPr>
+            <a:cxnSpLocks/>
+          </p:cNvCxnSpPr>
+          <p:nvPr/>
+        </p:nvCxnSpPr>
+        <p:spPr>
+          <a:xfrm flipV="1">
+            <a:off x="3421412" y="231253"/>
+            <a:ext cx="338641" cy="327192"/>
+          </a:xfrm>
+          <a:prstGeom prst="straightConnector1">
+            <a:avLst/>
+          </a:prstGeom>
+          <a:ln w="76200">
+            <a:solidFill>
+              <a:srgbClr val="EA4B56"/>
+            </a:solidFill>
+            <a:tailEnd type="triangle"/>
+          </a:ln>
+        </p:spPr>
+        <p:style>
+          <a:lnRef idx="1">
+            <a:schemeClr val="accent1"/>
+          </a:lnRef>
+          <a:fillRef idx="0">
+            <a:schemeClr val="accent1"/>
+          </a:fillRef>
+          <a:effectRef idx="0">
+            <a:schemeClr val="accent1"/>
+          </a:effectRef>
+          <a:fontRef idx="minor">
+            <a:schemeClr val="tx1"/>
+          </a:fontRef>
+        </p:style>
+      </p:cxnSp>
     </p:spTree>
     <p:extLst>
       <p:ext uri="{BB962C8B-B14F-4D97-AF65-F5344CB8AC3E}">

</xml_diff>